<commit_message>
Almost done with the updates - just need to handle proximity
</commit_message>
<xml_diff>
--- a/DataStructures.pptx
+++ b/DataStructures.pptx
@@ -108,6 +108,11 @@
       </a:defRPr>
     </a:lvl9pPr>
   </p:defaultTextStyle>
+  <p:extLst>
+    <p:ext uri="{EFAFB233-063F-42B5-8137-9DF3F51BA10A}">
+      <p15:sldGuideLst xmlns:p15="http://schemas.microsoft.com/office/powerpoint/2012/main"/>
+    </p:ext>
+  </p:extLst>
 </p:presentation>
 </file>
 
@@ -258,7 +263,7 @@
           <a:p>
             <a:fld id="{7601EB30-AB04-6349-A9B4-3FED7D894AE4}" type="datetimeFigureOut">
               <a:rPr lang="en-US" smtClean="0"/>
-              <a:t>4/18/18</a:t>
+              <a:t>4/19/18</a:t>
             </a:fld>
             <a:endParaRPr lang="en-US"/>
           </a:p>
@@ -456,7 +461,7 @@
           <a:p>
             <a:fld id="{7601EB30-AB04-6349-A9B4-3FED7D894AE4}" type="datetimeFigureOut">
               <a:rPr lang="en-US" smtClean="0"/>
-              <a:t>4/18/18</a:t>
+              <a:t>4/19/18</a:t>
             </a:fld>
             <a:endParaRPr lang="en-US"/>
           </a:p>
@@ -664,7 +669,7 @@
           <a:p>
             <a:fld id="{7601EB30-AB04-6349-A9B4-3FED7D894AE4}" type="datetimeFigureOut">
               <a:rPr lang="en-US" smtClean="0"/>
-              <a:t>4/18/18</a:t>
+              <a:t>4/19/18</a:t>
             </a:fld>
             <a:endParaRPr lang="en-US"/>
           </a:p>
@@ -862,7 +867,7 @@
           <a:p>
             <a:fld id="{7601EB30-AB04-6349-A9B4-3FED7D894AE4}" type="datetimeFigureOut">
               <a:rPr lang="en-US" smtClean="0"/>
-              <a:t>4/18/18</a:t>
+              <a:t>4/19/18</a:t>
             </a:fld>
             <a:endParaRPr lang="en-US"/>
           </a:p>
@@ -1137,7 +1142,7 @@
           <a:p>
             <a:fld id="{7601EB30-AB04-6349-A9B4-3FED7D894AE4}" type="datetimeFigureOut">
               <a:rPr lang="en-US" smtClean="0"/>
-              <a:t>4/18/18</a:t>
+              <a:t>4/19/18</a:t>
             </a:fld>
             <a:endParaRPr lang="en-US"/>
           </a:p>
@@ -1402,7 +1407,7 @@
           <a:p>
             <a:fld id="{7601EB30-AB04-6349-A9B4-3FED7D894AE4}" type="datetimeFigureOut">
               <a:rPr lang="en-US" smtClean="0"/>
-              <a:t>4/18/18</a:t>
+              <a:t>4/19/18</a:t>
             </a:fld>
             <a:endParaRPr lang="en-US"/>
           </a:p>
@@ -1814,7 +1819,7 @@
           <a:p>
             <a:fld id="{7601EB30-AB04-6349-A9B4-3FED7D894AE4}" type="datetimeFigureOut">
               <a:rPr lang="en-US" smtClean="0"/>
-              <a:t>4/18/18</a:t>
+              <a:t>4/19/18</a:t>
             </a:fld>
             <a:endParaRPr lang="en-US"/>
           </a:p>
@@ -1955,7 +1960,7 @@
           <a:p>
             <a:fld id="{7601EB30-AB04-6349-A9B4-3FED7D894AE4}" type="datetimeFigureOut">
               <a:rPr lang="en-US" smtClean="0"/>
-              <a:t>4/18/18</a:t>
+              <a:t>4/19/18</a:t>
             </a:fld>
             <a:endParaRPr lang="en-US"/>
           </a:p>
@@ -2068,7 +2073,7 @@
           <a:p>
             <a:fld id="{7601EB30-AB04-6349-A9B4-3FED7D894AE4}" type="datetimeFigureOut">
               <a:rPr lang="en-US" smtClean="0"/>
-              <a:t>4/18/18</a:t>
+              <a:t>4/19/18</a:t>
             </a:fld>
             <a:endParaRPr lang="en-US"/>
           </a:p>
@@ -2379,7 +2384,7 @@
           <a:p>
             <a:fld id="{7601EB30-AB04-6349-A9B4-3FED7D894AE4}" type="datetimeFigureOut">
               <a:rPr lang="en-US" smtClean="0"/>
-              <a:t>4/18/18</a:t>
+              <a:t>4/19/18</a:t>
             </a:fld>
             <a:endParaRPr lang="en-US"/>
           </a:p>
@@ -2667,7 +2672,7 @@
           <a:p>
             <a:fld id="{7601EB30-AB04-6349-A9B4-3FED7D894AE4}" type="datetimeFigureOut">
               <a:rPr lang="en-US" smtClean="0"/>
-              <a:t>4/18/18</a:t>
+              <a:t>4/19/18</a:t>
             </a:fld>
             <a:endParaRPr lang="en-US"/>
           </a:p>
@@ -2908,7 +2913,7 @@
           <a:p>
             <a:fld id="{7601EB30-AB04-6349-A9B4-3FED7D894AE4}" type="datetimeFigureOut">
               <a:rPr lang="en-US" smtClean="0"/>
-              <a:t>4/18/18</a:t>
+              <a:t>4/19/18</a:t>
             </a:fld>
             <a:endParaRPr lang="en-US"/>
           </a:p>
@@ -7440,18 +7445,18 @@
                   <a:schemeClr val="accent1"/>
                 </a:solidFill>
               </a:rPr>
-              <a:t>'gold': 0.301, </a:t>
-            </a:r>
-          </a:p>
-          <a:p>
-            <a:pPr lvl="1"/>
-            <a:r>
-              <a:rPr lang="en-US" sz="1600" dirty="0">
-                <a:solidFill>
-                  <a:schemeClr val="accent1"/>
-                </a:solidFill>
-              </a:rPr>
-              <a:t>'shipment': 0.301, </a:t>
+              <a:t>'gold’: [0.301, 4], </a:t>
+            </a:r>
+          </a:p>
+          <a:p>
+            <a:pPr lvl="1"/>
+            <a:r>
+              <a:rPr lang="en-US" sz="1600" dirty="0">
+                <a:solidFill>
+                  <a:schemeClr val="accent1"/>
+                </a:solidFill>
+              </a:rPr>
+              <a:t>'shipment’: [0.301, 5], </a:t>
             </a:r>
           </a:p>
           <a:p>
@@ -7478,7 +7483,7 @@
                   <a:schemeClr val="accent1"/>
                 </a:solidFill>
               </a:rPr>
-              <a:t>': 0.602, </a:t>
+              <a:t>’: [0.602, 2], </a:t>
             </a:r>
           </a:p>
           <a:p>
@@ -7505,40 +7510,40 @@
                   <a:schemeClr val="accent1"/>
                 </a:solidFill>
               </a:rPr>
-              <a:t>': 0.301, </a:t>
-            </a:r>
-          </a:p>
-          <a:p>
-            <a:pPr lvl="1"/>
-            <a:r>
-              <a:rPr lang="en-US" sz="1600" dirty="0">
-                <a:solidFill>
-                  <a:schemeClr val="accent1"/>
-                </a:solidFill>
-              </a:rPr>
-              <a:t>'silver': 0.602, </a:t>
-            </a:r>
-          </a:p>
-          <a:p>
-            <a:pPr lvl="1"/>
-            <a:r>
-              <a:rPr lang="en-US" sz="1600" dirty="0">
-                <a:solidFill>
-                  <a:schemeClr val="accent1"/>
-                </a:solidFill>
-              </a:rPr>
-              <a:t>'fire': 0.602, </a:t>
-            </a:r>
-          </a:p>
-          <a:p>
-            <a:pPr lvl="1"/>
-            <a:r>
-              <a:rPr lang="en-US" sz="1600" dirty="0">
-                <a:solidFill>
-                  <a:schemeClr val="accent1"/>
-                </a:solidFill>
-              </a:rPr>
-              <a:t>'truck': 0.125, </a:t>
+              <a:t>’: [0.301, 1], </a:t>
+            </a:r>
+          </a:p>
+          <a:p>
+            <a:pPr lvl="1"/>
+            <a:r>
+              <a:rPr lang="en-US" sz="1600" dirty="0">
+                <a:solidFill>
+                  <a:schemeClr val="accent1"/>
+                </a:solidFill>
+              </a:rPr>
+              <a:t>'silver’: [0.602, 6], </a:t>
+            </a:r>
+          </a:p>
+          <a:p>
+            <a:pPr lvl="1"/>
+            <a:r>
+              <a:rPr lang="en-US" sz="1600" dirty="0">
+                <a:solidFill>
+                  <a:schemeClr val="accent1"/>
+                </a:solidFill>
+              </a:rPr>
+              <a:t>'fire’: [0.602, 3], </a:t>
+            </a:r>
+          </a:p>
+          <a:p>
+            <a:pPr lvl="1"/>
+            <a:r>
+              <a:rPr lang="en-US" sz="1600" dirty="0">
+                <a:solidFill>
+                  <a:schemeClr val="accent1"/>
+                </a:solidFill>
+              </a:rPr>
+              <a:t>'truck’: [0.125, 7], </a:t>
             </a:r>
           </a:p>
           <a:p>
@@ -7565,7 +7570,7 @@
                   <a:schemeClr val="accent1"/>
                 </a:solidFill>
               </a:rPr>
-              <a:t>': 0.125</a:t>
+              <a:t>’: [0.125, 0]</a:t>
             </a:r>
           </a:p>
           <a:p>
@@ -7837,8 +7842,8 @@
         </p:nvSpPr>
         <p:spPr>
           <a:xfrm>
-            <a:off x="991343" y="3351541"/>
-            <a:ext cx="2239943" cy="2554545"/>
+            <a:off x="704137" y="3351541"/>
+            <a:ext cx="2527150" cy="2554545"/>
           </a:xfrm>
           <a:prstGeom prst="rect">
             <a:avLst/>
@@ -7876,18 +7881,18 @@
                   <a:schemeClr val="accent1"/>
                 </a:solidFill>
               </a:rPr>
-              <a:t>'gold': 0.301, </a:t>
-            </a:r>
-          </a:p>
-          <a:p>
-            <a:pPr lvl="1"/>
-            <a:r>
-              <a:rPr lang="en-US" sz="1600" dirty="0">
-                <a:solidFill>
-                  <a:schemeClr val="accent1"/>
-                </a:solidFill>
-              </a:rPr>
-              <a:t>'shipment': 0.301, </a:t>
+              <a:t>'gold’: [0.301, 4], </a:t>
+            </a:r>
+          </a:p>
+          <a:p>
+            <a:pPr lvl="1"/>
+            <a:r>
+              <a:rPr lang="en-US" sz="1600" dirty="0">
+                <a:solidFill>
+                  <a:schemeClr val="accent1"/>
+                </a:solidFill>
+              </a:rPr>
+              <a:t>'shipment’: [0.301, 5], </a:t>
             </a:r>
           </a:p>
           <a:p>
@@ -7914,7 +7919,7 @@
                   <a:schemeClr val="accent1"/>
                 </a:solidFill>
               </a:rPr>
-              <a:t>': 0.602, </a:t>
+              <a:t>’: [0.602, 2], </a:t>
             </a:r>
           </a:p>
           <a:p>
@@ -7941,40 +7946,40 @@
                   <a:schemeClr val="accent1"/>
                 </a:solidFill>
               </a:rPr>
-              <a:t>': 0.301, </a:t>
-            </a:r>
-          </a:p>
-          <a:p>
-            <a:pPr lvl="1"/>
-            <a:r>
-              <a:rPr lang="en-US" sz="1600" dirty="0">
-                <a:solidFill>
-                  <a:schemeClr val="accent1"/>
-                </a:solidFill>
-              </a:rPr>
-              <a:t>'silver': 0.602, </a:t>
-            </a:r>
-          </a:p>
-          <a:p>
-            <a:pPr lvl="1"/>
-            <a:r>
-              <a:rPr lang="en-US" sz="1600" dirty="0">
-                <a:solidFill>
-                  <a:schemeClr val="accent1"/>
-                </a:solidFill>
-              </a:rPr>
-              <a:t>'fire': 0.602, </a:t>
-            </a:r>
-          </a:p>
-          <a:p>
-            <a:pPr lvl="1"/>
-            <a:r>
-              <a:rPr lang="en-US" sz="1600" dirty="0">
-                <a:solidFill>
-                  <a:schemeClr val="accent1"/>
-                </a:solidFill>
-              </a:rPr>
-              <a:t>'truck': 0.125, </a:t>
+              <a:t>’: [0.301, 1], </a:t>
+            </a:r>
+          </a:p>
+          <a:p>
+            <a:pPr lvl="1"/>
+            <a:r>
+              <a:rPr lang="en-US" sz="1600" dirty="0">
+                <a:solidFill>
+                  <a:schemeClr val="accent1"/>
+                </a:solidFill>
+              </a:rPr>
+              <a:t>'silver’: [0.602, 6], </a:t>
+            </a:r>
+          </a:p>
+          <a:p>
+            <a:pPr lvl="1"/>
+            <a:r>
+              <a:rPr lang="en-US" sz="1600" dirty="0">
+                <a:solidFill>
+                  <a:schemeClr val="accent1"/>
+                </a:solidFill>
+              </a:rPr>
+              <a:t>'fire’: [0.602, 3], </a:t>
+            </a:r>
+          </a:p>
+          <a:p>
+            <a:pPr lvl="1"/>
+            <a:r>
+              <a:rPr lang="en-US" sz="1600" dirty="0">
+                <a:solidFill>
+                  <a:schemeClr val="accent1"/>
+                </a:solidFill>
+              </a:rPr>
+              <a:t>'truck’: [0.125, 7], </a:t>
             </a:r>
           </a:p>
           <a:p>
@@ -8001,7 +8006,7 @@
                   <a:schemeClr val="accent1"/>
                 </a:solidFill>
               </a:rPr>
-              <a:t>': 0.125</a:t>
+              <a:t>’: [0.125, 0]</a:t>
             </a:r>
           </a:p>
           <a:p>
@@ -8182,8 +8187,8 @@
         </p:nvCxnSpPr>
         <p:spPr>
           <a:xfrm flipH="1">
-            <a:off x="1750300" y="2212551"/>
-            <a:ext cx="2828315" cy="1409010"/>
+            <a:off x="1480822" y="2212551"/>
+            <a:ext cx="3097793" cy="1418119"/>
           </a:xfrm>
           <a:prstGeom prst="line">
             <a:avLst/>
@@ -8265,8 +8270,8 @@
         </p:nvSpPr>
         <p:spPr>
           <a:xfrm>
-            <a:off x="1522323" y="3621561"/>
-            <a:ext cx="455953" cy="315387"/>
+            <a:off x="1252845" y="3630670"/>
+            <a:ext cx="455953" cy="324496"/>
           </a:xfrm>
           <a:prstGeom prst="ellipse">
             <a:avLst/>

</xml_diff>